<commit_message>
✨ Updated slide and notebook for class 1
</commit_message>
<xml_diff>
--- a/classes/C0/slide/Presentacion 1710 - C0.pptx
+++ b/classes/C0/slide/Presentacion 1710 - C0.pptx
@@ -5,7 +5,7 @@
     <p:sldMasterId id="2147483648" r:id="rId1"/>
   </p:sldMasterIdLst>
   <p:notesMasterIdLst>
-    <p:notesMasterId r:id="rId12"/>
+    <p:notesMasterId r:id="rId13"/>
   </p:notesMasterIdLst>
   <p:sldIdLst>
     <p:sldId id="256" r:id="rId2"/>
@@ -15,9 +15,10 @@
     <p:sldId id="263" r:id="rId6"/>
     <p:sldId id="262" r:id="rId7"/>
     <p:sldId id="264" r:id="rId8"/>
-    <p:sldId id="265" r:id="rId9"/>
-    <p:sldId id="260" r:id="rId10"/>
-    <p:sldId id="261" r:id="rId11"/>
+    <p:sldId id="266" r:id="rId9"/>
+    <p:sldId id="265" r:id="rId10"/>
+    <p:sldId id="260" r:id="rId11"/>
+    <p:sldId id="261" r:id="rId12"/>
   </p:sldIdLst>
   <p:sldSz cx="12192000" cy="6858000"/>
   <p:notesSz cx="6858000" cy="9144000"/>
@@ -624,6 +625,90 @@
             <a:fld id="{14707AD0-4195-5740-9617-47CC2C752DAE}" type="slidenum">
               <a:rPr lang="en-CO" smtClean="0"/>
               <a:t>8</a:t>
+            </a:fld>
+            <a:endParaRPr lang="en-CO"/>
+          </a:p>
+        </p:txBody>
+      </p:sp>
+    </p:spTree>
+    <p:extLst>
+      <p:ext uri="{BB962C8B-B14F-4D97-AF65-F5344CB8AC3E}">
+        <p14:creationId xmlns:p14="http://schemas.microsoft.com/office/powerpoint/2010/main" val="2654241230"/>
+      </p:ext>
+    </p:extLst>
+  </p:cSld>
+  <p:clrMapOvr>
+    <a:masterClrMapping/>
+  </p:clrMapOvr>
+</p:notes>
+</file>
+
+<file path=ppt/notesSlides/notesSlide3.xml><?xml version="1.0" encoding="utf-8"?>
+<p:notes xmlns:a="http://schemas.openxmlformats.org/drawingml/2006/main" xmlns:r="http://schemas.openxmlformats.org/officeDocument/2006/relationships" xmlns:p="http://schemas.openxmlformats.org/presentationml/2006/main">
+  <p:cSld>
+    <p:spTree>
+      <p:nvGrpSpPr>
+        <p:cNvPr id="1" name=""/>
+        <p:cNvGrpSpPr/>
+        <p:nvPr/>
+      </p:nvGrpSpPr>
+      <p:grpSpPr>
+        <a:xfrm>
+          <a:off x="0" y="0"/>
+          <a:ext cx="0" cy="0"/>
+          <a:chOff x="0" y="0"/>
+          <a:chExt cx="0" cy="0"/>
+        </a:xfrm>
+      </p:grpSpPr>
+      <p:sp>
+        <p:nvSpPr>
+          <p:cNvPr id="2" name="Slide Image Placeholder 1"/>
+          <p:cNvSpPr>
+            <a:spLocks noGrp="1" noRot="1" noChangeAspect="1"/>
+          </p:cNvSpPr>
+          <p:nvPr>
+            <p:ph type="sldImg"/>
+          </p:nvPr>
+        </p:nvSpPr>
+        <p:spPr/>
+      </p:sp>
+      <p:sp>
+        <p:nvSpPr>
+          <p:cNvPr id="3" name="Notes Placeholder 2"/>
+          <p:cNvSpPr>
+            <a:spLocks noGrp="1"/>
+          </p:cNvSpPr>
+          <p:nvPr>
+            <p:ph type="body" idx="1"/>
+          </p:nvPr>
+        </p:nvSpPr>
+        <p:spPr/>
+        <p:txBody>
+          <a:bodyPr/>
+          <a:lstStyle/>
+          <a:p>
+            <a:endParaRPr lang="en-CO" dirty="0"/>
+          </a:p>
+        </p:txBody>
+      </p:sp>
+      <p:sp>
+        <p:nvSpPr>
+          <p:cNvPr id="4" name="Slide Number Placeholder 3"/>
+          <p:cNvSpPr>
+            <a:spLocks noGrp="1"/>
+          </p:cNvSpPr>
+          <p:nvPr>
+            <p:ph type="sldNum" sz="quarter" idx="5"/>
+          </p:nvPr>
+        </p:nvSpPr>
+        <p:spPr/>
+        <p:txBody>
+          <a:bodyPr/>
+          <a:lstStyle/>
+          <a:p>
+            <a:fld id="{14707AD0-4195-5740-9617-47CC2C752DAE}" type="slidenum">
+              <a:rPr lang="en-CO" smtClean="0"/>
+              <a:t>9</a:t>
             </a:fld>
             <a:endParaRPr lang="en-CO"/>
           </a:p>
@@ -4096,6 +4181,145 @@
         </p:blipFill>
         <p:spPr>
           <a:xfrm>
+            <a:off x="5639" y="0"/>
+            <a:ext cx="12180721" cy="6858000"/>
+          </a:xfrm>
+          <a:prstGeom prst="rect">
+            <a:avLst/>
+          </a:prstGeom>
+        </p:spPr>
+      </p:pic>
+      <p:pic>
+        <p:nvPicPr>
+          <p:cNvPr id="5" name="Picture 4">
+            <a:extLst>
+              <a:ext uri="{FF2B5EF4-FFF2-40B4-BE49-F238E27FC236}">
+                <a16:creationId xmlns:a16="http://schemas.microsoft.com/office/drawing/2014/main" id="{BAEB1E73-735B-3E43-8D83-C2598B1390B1}"/>
+              </a:ext>
+            </a:extLst>
+          </p:cNvPr>
+          <p:cNvPicPr>
+            <a:picLocks noChangeAspect="1"/>
+          </p:cNvPicPr>
+          <p:nvPr/>
+        </p:nvPicPr>
+        <p:blipFill>
+          <a:blip r:embed="rId3"/>
+          <a:stretch>
+            <a:fillRect/>
+          </a:stretch>
+        </p:blipFill>
+        <p:spPr>
+          <a:xfrm>
+            <a:off x="2452731" y="2296885"/>
+            <a:ext cx="4227111" cy="2100263"/>
+          </a:xfrm>
+          <a:prstGeom prst="rect">
+            <a:avLst/>
+          </a:prstGeom>
+        </p:spPr>
+      </p:pic>
+    </p:spTree>
+    <p:extLst>
+      <p:ext uri="{BB962C8B-B14F-4D97-AF65-F5344CB8AC3E}">
+        <p14:creationId xmlns:p14="http://schemas.microsoft.com/office/powerpoint/2010/main" val="2652355391"/>
+      </p:ext>
+    </p:extLst>
+  </p:cSld>
+  <p:clrMapOvr>
+    <a:masterClrMapping/>
+  </p:clrMapOvr>
+</p:sld>
+</file>
+
+<file path=ppt/slides/slide11.xml><?xml version="1.0" encoding="utf-8"?>
+<p:sld xmlns:a="http://schemas.openxmlformats.org/drawingml/2006/main" xmlns:r="http://schemas.openxmlformats.org/officeDocument/2006/relationships" xmlns:p="http://schemas.openxmlformats.org/presentationml/2006/main">
+  <p:cSld>
+    <p:spTree>
+      <p:nvGrpSpPr>
+        <p:cNvPr id="1" name=""/>
+        <p:cNvGrpSpPr/>
+        <p:nvPr/>
+      </p:nvGrpSpPr>
+      <p:grpSpPr>
+        <a:xfrm>
+          <a:off x="0" y="0"/>
+          <a:ext cx="0" cy="0"/>
+          <a:chOff x="0" y="0"/>
+          <a:chExt cx="0" cy="0"/>
+        </a:xfrm>
+      </p:grpSpPr>
+      <p:sp>
+        <p:nvSpPr>
+          <p:cNvPr id="2" name="Title 1">
+            <a:extLst>
+              <a:ext uri="{FF2B5EF4-FFF2-40B4-BE49-F238E27FC236}">
+                <a16:creationId xmlns:a16="http://schemas.microsoft.com/office/drawing/2014/main" id="{F350BF34-D2C6-DF40-A1BD-D8F51B906427}"/>
+              </a:ext>
+            </a:extLst>
+          </p:cNvPr>
+          <p:cNvSpPr>
+            <a:spLocks noGrp="1"/>
+          </p:cNvSpPr>
+          <p:nvPr>
+            <p:ph type="ctrTitle"/>
+          </p:nvPr>
+        </p:nvSpPr>
+        <p:spPr/>
+        <p:txBody>
+          <a:bodyPr/>
+          <a:lstStyle/>
+          <a:p>
+            <a:endParaRPr lang="en-CO"/>
+          </a:p>
+        </p:txBody>
+      </p:sp>
+      <p:sp>
+        <p:nvSpPr>
+          <p:cNvPr id="3" name="Subtitle 2">
+            <a:extLst>
+              <a:ext uri="{FF2B5EF4-FFF2-40B4-BE49-F238E27FC236}">
+                <a16:creationId xmlns:a16="http://schemas.microsoft.com/office/drawing/2014/main" id="{54BA92A7-32F0-0F41-8FB7-10991E97EC29}"/>
+              </a:ext>
+            </a:extLst>
+          </p:cNvPr>
+          <p:cNvSpPr>
+            <a:spLocks noGrp="1"/>
+          </p:cNvSpPr>
+          <p:nvPr>
+            <p:ph type="subTitle" idx="1"/>
+          </p:nvPr>
+        </p:nvSpPr>
+        <p:spPr/>
+        <p:txBody>
+          <a:bodyPr/>
+          <a:lstStyle/>
+          <a:p>
+            <a:endParaRPr lang="en-CO"/>
+          </a:p>
+        </p:txBody>
+      </p:sp>
+      <p:pic>
+        <p:nvPicPr>
+          <p:cNvPr id="6" name="Picture 5">
+            <a:extLst>
+              <a:ext uri="{FF2B5EF4-FFF2-40B4-BE49-F238E27FC236}">
+                <a16:creationId xmlns:a16="http://schemas.microsoft.com/office/drawing/2014/main" id="{27679755-7146-3A4C-82DE-25D7133F6476}"/>
+              </a:ext>
+            </a:extLst>
+          </p:cNvPr>
+          <p:cNvPicPr>
+            <a:picLocks noChangeAspect="1"/>
+          </p:cNvPicPr>
+          <p:nvPr/>
+        </p:nvPicPr>
+        <p:blipFill>
+          <a:blip r:embed="rId2"/>
+          <a:srcRect/>
+          <a:stretch/>
+        </p:blipFill>
+        <p:spPr>
+          <a:xfrm>
             <a:off x="0" y="0"/>
             <a:ext cx="12192000" cy="6858000"/>
           </a:xfrm>
@@ -6641,6 +6865,178 @@
 </file>
 
 <file path=ppt/slides/slide8.xml><?xml version="1.0" encoding="utf-8"?>
+<p:sld xmlns:a="http://schemas.openxmlformats.org/drawingml/2006/main" xmlns:r="http://schemas.openxmlformats.org/officeDocument/2006/relationships" xmlns:p="http://schemas.openxmlformats.org/presentationml/2006/main">
+  <p:cSld>
+    <p:spTree>
+      <p:nvGrpSpPr>
+        <p:cNvPr id="1" name=""/>
+        <p:cNvGrpSpPr/>
+        <p:nvPr/>
+      </p:nvGrpSpPr>
+      <p:grpSpPr>
+        <a:xfrm>
+          <a:off x="0" y="0"/>
+          <a:ext cx="0" cy="0"/>
+          <a:chOff x="0" y="0"/>
+          <a:chExt cx="0" cy="0"/>
+        </a:xfrm>
+      </p:grpSpPr>
+      <p:sp>
+        <p:nvSpPr>
+          <p:cNvPr id="2" name="Title 1">
+            <a:extLst>
+              <a:ext uri="{FF2B5EF4-FFF2-40B4-BE49-F238E27FC236}">
+                <a16:creationId xmlns:a16="http://schemas.microsoft.com/office/drawing/2014/main" id="{F350BF34-D2C6-DF40-A1BD-D8F51B906427}"/>
+              </a:ext>
+            </a:extLst>
+          </p:cNvPr>
+          <p:cNvSpPr>
+            <a:spLocks noGrp="1"/>
+          </p:cNvSpPr>
+          <p:nvPr>
+            <p:ph type="ctrTitle"/>
+          </p:nvPr>
+        </p:nvSpPr>
+        <p:spPr>
+          <a:xfrm>
+            <a:off x="1524000" y="512564"/>
+            <a:ext cx="9144000" cy="368135"/>
+          </a:xfrm>
+        </p:spPr>
+        <p:txBody>
+          <a:bodyPr>
+            <a:normAutofit fontScale="90000"/>
+          </a:bodyPr>
+          <a:lstStyle/>
+          <a:p>
+            <a:r>
+              <a:rPr lang="en-CO" dirty="0">
+                <a:latin typeface="Arial" panose="020B0604020202020204" pitchFamily="34" charset="0"/>
+                <a:cs typeface="Arial" panose="020B0604020202020204" pitchFamily="34" charset="0"/>
+              </a:rPr>
+              <a:t>Tablero</a:t>
+            </a:r>
+          </a:p>
+        </p:txBody>
+      </p:sp>
+      <p:pic>
+        <p:nvPicPr>
+          <p:cNvPr id="6" name="Picture 5">
+            <a:extLst>
+              <a:ext uri="{FF2B5EF4-FFF2-40B4-BE49-F238E27FC236}">
+                <a16:creationId xmlns:a16="http://schemas.microsoft.com/office/drawing/2014/main" id="{27679755-7146-3A4C-82DE-25D7133F6476}"/>
+              </a:ext>
+            </a:extLst>
+          </p:cNvPr>
+          <p:cNvPicPr>
+            <a:picLocks noChangeAspect="1"/>
+          </p:cNvPicPr>
+          <p:nvPr/>
+        </p:nvPicPr>
+        <p:blipFill rotWithShape="1">
+          <a:blip r:embed="rId3"/>
+          <a:srcRect t="92613"/>
+          <a:stretch/>
+        </p:blipFill>
+        <p:spPr>
+          <a:xfrm>
+            <a:off x="0" y="6351372"/>
+            <a:ext cx="12192000" cy="506627"/>
+          </a:xfrm>
+          <a:prstGeom prst="rect">
+            <a:avLst/>
+          </a:prstGeom>
+        </p:spPr>
+      </p:pic>
+      <p:sp>
+        <p:nvSpPr>
+          <p:cNvPr id="4" name="AutoShape 2">
+            <a:extLst>
+              <a:ext uri="{FF2B5EF4-FFF2-40B4-BE49-F238E27FC236}">
+                <a16:creationId xmlns:a16="http://schemas.microsoft.com/office/drawing/2014/main" id="{AC508B9B-B694-13D4-D0F3-2048AC562705}"/>
+              </a:ext>
+            </a:extLst>
+          </p:cNvPr>
+          <p:cNvSpPr>
+            <a:spLocks noChangeAspect="1" noChangeArrowheads="1"/>
+          </p:cNvSpPr>
+          <p:nvPr/>
+        </p:nvSpPr>
+        <p:spPr bwMode="auto">
+          <a:xfrm>
+            <a:off x="5943600" y="3276600"/>
+            <a:ext cx="4724400" cy="4724400"/>
+          </a:xfrm>
+          <a:prstGeom prst="rect">
+            <a:avLst/>
+          </a:prstGeom>
+          <a:noFill/>
+          <a:extLst>
+            <a:ext uri="{909E8E84-426E-40DD-AFC4-6F175D3DCCD1}">
+              <a14:hiddenFill xmlns:a14="http://schemas.microsoft.com/office/drawing/2010/main">
+                <a:solidFill>
+                  <a:srgbClr val="FFFFFF"/>
+                </a:solidFill>
+              </a14:hiddenFill>
+            </a:ext>
+          </a:extLst>
+        </p:spPr>
+        <p:txBody>
+          <a:bodyPr vert="horz" wrap="square" lIns="91440" tIns="45720" rIns="91440" bIns="45720" numCol="1" anchor="t" anchorCtr="0" compatLnSpc="1">
+            <a:prstTxWarp prst="textNoShape">
+              <a:avLst/>
+            </a:prstTxWarp>
+          </a:bodyPr>
+          <a:lstStyle/>
+          <a:p>
+            <a:endParaRPr lang="en-CO"/>
+          </a:p>
+        </p:txBody>
+      </p:sp>
+      <p:pic>
+        <p:nvPicPr>
+          <p:cNvPr id="10" name="Picture 9">
+            <a:extLst>
+              <a:ext uri="{FF2B5EF4-FFF2-40B4-BE49-F238E27FC236}">
+                <a16:creationId xmlns:a16="http://schemas.microsoft.com/office/drawing/2014/main" id="{D3BE4B29-8993-7681-6053-E476B88DEC9D}"/>
+              </a:ext>
+            </a:extLst>
+          </p:cNvPr>
+          <p:cNvPicPr>
+            <a:picLocks noChangeAspect="1"/>
+          </p:cNvPicPr>
+          <p:nvPr/>
+        </p:nvPicPr>
+        <p:blipFill>
+          <a:blip r:embed="rId4"/>
+          <a:stretch>
+            <a:fillRect/>
+          </a:stretch>
+        </p:blipFill>
+        <p:spPr>
+          <a:xfrm>
+            <a:off x="2209800" y="1023101"/>
+            <a:ext cx="7772400" cy="5834899"/>
+          </a:xfrm>
+          <a:prstGeom prst="rect">
+            <a:avLst/>
+          </a:prstGeom>
+        </p:spPr>
+      </p:pic>
+    </p:spTree>
+    <p:extLst>
+      <p:ext uri="{BB962C8B-B14F-4D97-AF65-F5344CB8AC3E}">
+        <p14:creationId xmlns:p14="http://schemas.microsoft.com/office/powerpoint/2010/main" val="2123988130"/>
+      </p:ext>
+    </p:extLst>
+  </p:cSld>
+  <p:clrMapOvr>
+    <a:masterClrMapping/>
+  </p:clrMapOvr>
+</p:sld>
+</file>
+
+<file path=ppt/slides/slide9.xml><?xml version="1.0" encoding="utf-8"?>
 <p:sld xmlns:a="http://schemas.openxmlformats.org/drawingml/2006/main" xmlns:r="http://schemas.openxmlformats.org/officeDocument/2006/relationships" xmlns:p="http://schemas.openxmlformats.org/presentationml/2006/main" show="0">
   <p:cSld>
     <p:spTree>
@@ -7076,145 +7472,6 @@
     <p:extLst>
       <p:ext uri="{BB962C8B-B14F-4D97-AF65-F5344CB8AC3E}">
         <p14:creationId xmlns:p14="http://schemas.microsoft.com/office/powerpoint/2010/main" val="1111356589"/>
-      </p:ext>
-    </p:extLst>
-  </p:cSld>
-  <p:clrMapOvr>
-    <a:masterClrMapping/>
-  </p:clrMapOvr>
-</p:sld>
-</file>
-
-<file path=ppt/slides/slide9.xml><?xml version="1.0" encoding="utf-8"?>
-<p:sld xmlns:a="http://schemas.openxmlformats.org/drawingml/2006/main" xmlns:r="http://schemas.openxmlformats.org/officeDocument/2006/relationships" xmlns:p="http://schemas.openxmlformats.org/presentationml/2006/main">
-  <p:cSld>
-    <p:spTree>
-      <p:nvGrpSpPr>
-        <p:cNvPr id="1" name=""/>
-        <p:cNvGrpSpPr/>
-        <p:nvPr/>
-      </p:nvGrpSpPr>
-      <p:grpSpPr>
-        <a:xfrm>
-          <a:off x="0" y="0"/>
-          <a:ext cx="0" cy="0"/>
-          <a:chOff x="0" y="0"/>
-          <a:chExt cx="0" cy="0"/>
-        </a:xfrm>
-      </p:grpSpPr>
-      <p:sp>
-        <p:nvSpPr>
-          <p:cNvPr id="2" name="Title 1">
-            <a:extLst>
-              <a:ext uri="{FF2B5EF4-FFF2-40B4-BE49-F238E27FC236}">
-                <a16:creationId xmlns:a16="http://schemas.microsoft.com/office/drawing/2014/main" id="{F350BF34-D2C6-DF40-A1BD-D8F51B906427}"/>
-              </a:ext>
-            </a:extLst>
-          </p:cNvPr>
-          <p:cNvSpPr>
-            <a:spLocks noGrp="1"/>
-          </p:cNvSpPr>
-          <p:nvPr>
-            <p:ph type="ctrTitle"/>
-          </p:nvPr>
-        </p:nvSpPr>
-        <p:spPr/>
-        <p:txBody>
-          <a:bodyPr/>
-          <a:lstStyle/>
-          <a:p>
-            <a:endParaRPr lang="en-CO"/>
-          </a:p>
-        </p:txBody>
-      </p:sp>
-      <p:sp>
-        <p:nvSpPr>
-          <p:cNvPr id="3" name="Subtitle 2">
-            <a:extLst>
-              <a:ext uri="{FF2B5EF4-FFF2-40B4-BE49-F238E27FC236}">
-                <a16:creationId xmlns:a16="http://schemas.microsoft.com/office/drawing/2014/main" id="{54BA92A7-32F0-0F41-8FB7-10991E97EC29}"/>
-              </a:ext>
-            </a:extLst>
-          </p:cNvPr>
-          <p:cNvSpPr>
-            <a:spLocks noGrp="1"/>
-          </p:cNvSpPr>
-          <p:nvPr>
-            <p:ph type="subTitle" idx="1"/>
-          </p:nvPr>
-        </p:nvSpPr>
-        <p:spPr/>
-        <p:txBody>
-          <a:bodyPr/>
-          <a:lstStyle/>
-          <a:p>
-            <a:endParaRPr lang="en-CO"/>
-          </a:p>
-        </p:txBody>
-      </p:sp>
-      <p:pic>
-        <p:nvPicPr>
-          <p:cNvPr id="6" name="Picture 5">
-            <a:extLst>
-              <a:ext uri="{FF2B5EF4-FFF2-40B4-BE49-F238E27FC236}">
-                <a16:creationId xmlns:a16="http://schemas.microsoft.com/office/drawing/2014/main" id="{27679755-7146-3A4C-82DE-25D7133F6476}"/>
-              </a:ext>
-            </a:extLst>
-          </p:cNvPr>
-          <p:cNvPicPr>
-            <a:picLocks noChangeAspect="1"/>
-          </p:cNvPicPr>
-          <p:nvPr/>
-        </p:nvPicPr>
-        <p:blipFill>
-          <a:blip r:embed="rId2"/>
-          <a:srcRect/>
-          <a:stretch/>
-        </p:blipFill>
-        <p:spPr>
-          <a:xfrm>
-            <a:off x="5639" y="0"/>
-            <a:ext cx="12180721" cy="6858000"/>
-          </a:xfrm>
-          <a:prstGeom prst="rect">
-            <a:avLst/>
-          </a:prstGeom>
-        </p:spPr>
-      </p:pic>
-      <p:pic>
-        <p:nvPicPr>
-          <p:cNvPr id="5" name="Picture 4">
-            <a:extLst>
-              <a:ext uri="{FF2B5EF4-FFF2-40B4-BE49-F238E27FC236}">
-                <a16:creationId xmlns:a16="http://schemas.microsoft.com/office/drawing/2014/main" id="{BAEB1E73-735B-3E43-8D83-C2598B1390B1}"/>
-              </a:ext>
-            </a:extLst>
-          </p:cNvPr>
-          <p:cNvPicPr>
-            <a:picLocks noChangeAspect="1"/>
-          </p:cNvPicPr>
-          <p:nvPr/>
-        </p:nvPicPr>
-        <p:blipFill>
-          <a:blip r:embed="rId3"/>
-          <a:stretch>
-            <a:fillRect/>
-          </a:stretch>
-        </p:blipFill>
-        <p:spPr>
-          <a:xfrm>
-            <a:off x="2452731" y="2296885"/>
-            <a:ext cx="4227111" cy="2100263"/>
-          </a:xfrm>
-          <a:prstGeom prst="rect">
-            <a:avLst/>
-          </a:prstGeom>
-        </p:spPr>
-      </p:pic>
-    </p:spTree>
-    <p:extLst>
-      <p:ext uri="{BB962C8B-B14F-4D97-AF65-F5344CB8AC3E}">
-        <p14:creationId xmlns:p14="http://schemas.microsoft.com/office/powerpoint/2010/main" val="2652355391"/>
       </p:ext>
     </p:extLst>
   </p:cSld>

</xml_diff>